<commit_message>
Minor correction on Fig 5 rotation lab
</commit_message>
<xml_diff>
--- a/StudentGuideModule1/rotation/rotation_fig5_new.pptx
+++ b/StudentGuideModule1/rotation/rotation_fig5_new.pptx
@@ -104,6 +104,11 @@
       </a:defRPr>
     </a:lvl9pPr>
   </p:defaultTextStyle>
+  <p:extLst>
+    <p:ext uri="{EFAFB233-063F-42B5-8137-9DF3F51BA10A}">
+      <p15:sldGuideLst xmlns:p15="http://schemas.microsoft.com/office/powerpoint/2012/main"/>
+    </p:ext>
+  </p:extLst>
 </p:presentation>
 </file>
 
@@ -254,7 +259,7 @@
           <a:p>
             <a:fld id="{27D892FE-FACB-4BB6-BD57-069805EE44A5}" type="datetimeFigureOut">
               <a:rPr lang="en-US" smtClean="0"/>
-              <a:t>7/25/2019</a:t>
+              <a:t>7/26/2019</a:t>
             </a:fld>
             <a:endParaRPr lang="en-US"/>
           </a:p>
@@ -452,7 +457,7 @@
           <a:p>
             <a:fld id="{27D892FE-FACB-4BB6-BD57-069805EE44A5}" type="datetimeFigureOut">
               <a:rPr lang="en-US" smtClean="0"/>
-              <a:t>7/25/2019</a:t>
+              <a:t>7/26/2019</a:t>
             </a:fld>
             <a:endParaRPr lang="en-US"/>
           </a:p>
@@ -660,7 +665,7 @@
           <a:p>
             <a:fld id="{27D892FE-FACB-4BB6-BD57-069805EE44A5}" type="datetimeFigureOut">
               <a:rPr lang="en-US" smtClean="0"/>
-              <a:t>7/25/2019</a:t>
+              <a:t>7/26/2019</a:t>
             </a:fld>
             <a:endParaRPr lang="en-US"/>
           </a:p>
@@ -858,7 +863,7 @@
           <a:p>
             <a:fld id="{27D892FE-FACB-4BB6-BD57-069805EE44A5}" type="datetimeFigureOut">
               <a:rPr lang="en-US" smtClean="0"/>
-              <a:t>7/25/2019</a:t>
+              <a:t>7/26/2019</a:t>
             </a:fld>
             <a:endParaRPr lang="en-US"/>
           </a:p>
@@ -1133,7 +1138,7 @@
           <a:p>
             <a:fld id="{27D892FE-FACB-4BB6-BD57-069805EE44A5}" type="datetimeFigureOut">
               <a:rPr lang="en-US" smtClean="0"/>
-              <a:t>7/25/2019</a:t>
+              <a:t>7/26/2019</a:t>
             </a:fld>
             <a:endParaRPr lang="en-US"/>
           </a:p>
@@ -1398,7 +1403,7 @@
           <a:p>
             <a:fld id="{27D892FE-FACB-4BB6-BD57-069805EE44A5}" type="datetimeFigureOut">
               <a:rPr lang="en-US" smtClean="0"/>
-              <a:t>7/25/2019</a:t>
+              <a:t>7/26/2019</a:t>
             </a:fld>
             <a:endParaRPr lang="en-US"/>
           </a:p>
@@ -1810,7 +1815,7 @@
           <a:p>
             <a:fld id="{27D892FE-FACB-4BB6-BD57-069805EE44A5}" type="datetimeFigureOut">
               <a:rPr lang="en-US" smtClean="0"/>
-              <a:t>7/25/2019</a:t>
+              <a:t>7/26/2019</a:t>
             </a:fld>
             <a:endParaRPr lang="en-US"/>
           </a:p>
@@ -1951,7 +1956,7 @@
           <a:p>
             <a:fld id="{27D892FE-FACB-4BB6-BD57-069805EE44A5}" type="datetimeFigureOut">
               <a:rPr lang="en-US" smtClean="0"/>
-              <a:t>7/25/2019</a:t>
+              <a:t>7/26/2019</a:t>
             </a:fld>
             <a:endParaRPr lang="en-US"/>
           </a:p>
@@ -2064,7 +2069,7 @@
           <a:p>
             <a:fld id="{27D892FE-FACB-4BB6-BD57-069805EE44A5}" type="datetimeFigureOut">
               <a:rPr lang="en-US" smtClean="0"/>
-              <a:t>7/25/2019</a:t>
+              <a:t>7/26/2019</a:t>
             </a:fld>
             <a:endParaRPr lang="en-US"/>
           </a:p>
@@ -2375,7 +2380,7 @@
           <a:p>
             <a:fld id="{27D892FE-FACB-4BB6-BD57-069805EE44A5}" type="datetimeFigureOut">
               <a:rPr lang="en-US" smtClean="0"/>
-              <a:t>7/25/2019</a:t>
+              <a:t>7/26/2019</a:t>
             </a:fld>
             <a:endParaRPr lang="en-US"/>
           </a:p>
@@ -2663,7 +2668,7 @@
           <a:p>
             <a:fld id="{27D892FE-FACB-4BB6-BD57-069805EE44A5}" type="datetimeFigureOut">
               <a:rPr lang="en-US" smtClean="0"/>
-              <a:t>7/25/2019</a:t>
+              <a:t>7/26/2019</a:t>
             </a:fld>
             <a:endParaRPr lang="en-US"/>
           </a:p>
@@ -2904,7 +2909,7 @@
           <a:p>
             <a:fld id="{27D892FE-FACB-4BB6-BD57-069805EE44A5}" type="datetimeFigureOut">
               <a:rPr lang="en-US" smtClean="0"/>
-              <a:t>7/25/2019</a:t>
+              <a:t>7/26/2019</a:t>
             </a:fld>
             <a:endParaRPr lang="en-US"/>
           </a:p>
@@ -4233,61 +4238,103 @@
             </a:p>
           </p:txBody>
         </p:sp>
-        <p:sp>
-          <p:nvSpPr>
-            <p:cNvPr id="33" name="Oval 32">
-              <a:extLst>
-                <a:ext uri="{FF2B5EF4-FFF2-40B4-BE49-F238E27FC236}">
-                  <a16:creationId xmlns:a16="http://schemas.microsoft.com/office/drawing/2014/main" id="{61299469-5A5E-4E7F-BE24-FFEBF7FF5A9B}"/>
-                </a:ext>
-              </a:extLst>
-            </p:cNvPr>
-            <p:cNvSpPr/>
-            <p:nvPr/>
-          </p:nvSpPr>
-          <p:spPr>
-            <a:xfrm rot="9195247">
-              <a:off x="3662244" y="4536363"/>
-              <a:ext cx="91440" cy="91440"/>
-            </a:xfrm>
-            <a:prstGeom prst="ellipse">
-              <a:avLst/>
-            </a:prstGeom>
-            <a:solidFill>
-              <a:schemeClr val="tx1"/>
-            </a:solidFill>
-            <a:ln>
-              <a:solidFill>
-                <a:schemeClr val="tx1"/>
-              </a:solidFill>
-            </a:ln>
-          </p:spPr>
-          <p:style>
-            <a:lnRef idx="2">
-              <a:schemeClr val="accent1">
-                <a:shade val="50000"/>
-              </a:schemeClr>
-            </a:lnRef>
-            <a:fillRef idx="1">
-              <a:schemeClr val="accent1"/>
-            </a:fillRef>
-            <a:effectRef idx="0">
-              <a:schemeClr val="accent1"/>
-            </a:effectRef>
-            <a:fontRef idx="minor">
-              <a:schemeClr val="lt1"/>
-            </a:fontRef>
-          </p:style>
-          <p:txBody>
-            <a:bodyPr rtlCol="0" anchor="ctr"/>
-            <a:lstStyle/>
-            <a:p>
-              <a:pPr algn="ctr"/>
-              <a:endParaRPr lang="en-US"/>
-            </a:p>
-          </p:txBody>
-        </p:sp>
       </p:grpSp>
+      <mc:AlternateContent xmlns:mc="http://schemas.openxmlformats.org/markup-compatibility/2006">
+        <mc:Choice xmlns:a14="http://schemas.microsoft.com/office/drawing/2010/main" Requires="a14">
+          <p:sp>
+            <p:nvSpPr>
+              <p:cNvPr id="3" name="TextBox 2">
+                <a:extLst>
+                  <a:ext uri="{FF2B5EF4-FFF2-40B4-BE49-F238E27FC236}">
+                    <a16:creationId xmlns:a16="http://schemas.microsoft.com/office/drawing/2014/main" id="{57D2EFE5-EC67-4C0E-B2F2-7BDE8AB4CFFF}"/>
+                  </a:ext>
+                </a:extLst>
+              </p:cNvPr>
+              <p:cNvSpPr txBox="1"/>
+              <p:nvPr/>
+            </p:nvSpPr>
+            <p:spPr>
+              <a:xfrm>
+                <a:off x="3535184" y="4339527"/>
+                <a:ext cx="344645" cy="438582"/>
+              </a:xfrm>
+              <a:prstGeom prst="rect">
+                <a:avLst/>
+              </a:prstGeom>
+              <a:noFill/>
+            </p:spPr>
+            <p:txBody>
+              <a:bodyPr wrap="none" lIns="0" tIns="0" rIns="0" bIns="0" rtlCol="0">
+                <a:spAutoFit/>
+              </a:bodyPr>
+              <a:lstStyle/>
+              <a:p>
+                <a14:m>
+                  <m:oMathPara xmlns:m="http://schemas.openxmlformats.org/officeDocument/2006/math">
+                    <m:oMathParaPr>
+                      <m:jc m:val="centerGroup"/>
+                    </m:oMathParaPr>
+                    <m:oMath xmlns:m="http://schemas.openxmlformats.org/officeDocument/2006/math">
+                      <m:r>
+                        <a:rPr lang="en-US" sz="2850" b="1" i="1" smtClean="0">
+                          <a:latin typeface="Cambria Math" panose="02040503050406030204" pitchFamily="18" charset="0"/>
+                          <a:ea typeface="Cambria Math" panose="02040503050406030204" pitchFamily="18" charset="0"/>
+                        </a:rPr>
+                        <m:t>×</m:t>
+                      </m:r>
+                    </m:oMath>
+                  </m:oMathPara>
+                </a14:m>
+                <a:endParaRPr lang="en-US" sz="2850" b="1" dirty="0"/>
+              </a:p>
+            </p:txBody>
+          </p:sp>
+        </mc:Choice>
+        <mc:Fallback>
+          <p:sp>
+            <p:nvSpPr>
+              <p:cNvPr id="3" name="TextBox 2">
+                <a:extLst>
+                  <a:ext uri="{FF2B5EF4-FFF2-40B4-BE49-F238E27FC236}">
+                    <a16:creationId xmlns:a16="http://schemas.microsoft.com/office/drawing/2014/main" id="{57D2EFE5-EC67-4C0E-B2F2-7BDE8AB4CFFF}"/>
+                  </a:ext>
+                </a:extLst>
+              </p:cNvPr>
+              <p:cNvSpPr txBox="1">
+                <a:spLocks noRot="1" noChangeAspect="1" noMove="1" noResize="1" noEditPoints="1" noAdjustHandles="1" noChangeArrowheads="1" noChangeShapeType="1" noTextEdit="1"/>
+              </p:cNvSpPr>
+              <p:nvPr/>
+            </p:nvSpPr>
+            <p:spPr>
+              <a:xfrm>
+                <a:off x="3535184" y="4339527"/>
+                <a:ext cx="344645" cy="438582"/>
+              </a:xfrm>
+              <a:prstGeom prst="rect">
+                <a:avLst/>
+              </a:prstGeom>
+              <a:blipFill>
+                <a:blip r:embed="rId2"/>
+                <a:stretch>
+                  <a:fillRect/>
+                </a:stretch>
+              </a:blipFill>
+            </p:spPr>
+            <p:txBody>
+              <a:bodyPr/>
+              <a:lstStyle/>
+              <a:p>
+                <a:r>
+                  <a:rPr lang="en-US">
+                    <a:noFill/>
+                  </a:rPr>
+                  <a:t> </a:t>
+                </a:r>
+              </a:p>
+            </p:txBody>
+          </p:sp>
+        </mc:Fallback>
+      </mc:AlternateContent>
     </p:spTree>
     <p:extLst>
       <p:ext uri="{BB962C8B-B14F-4D97-AF65-F5344CB8AC3E}">

</xml_diff>

<commit_message>
Implemented previous commit as cropped eps
</commit_message>
<xml_diff>
--- a/StudentGuideModule1/rotation/rotation_fig5_new.pptx
+++ b/StudentGuideModule1/rotation/rotation_fig5_new.pptx
@@ -3340,10 +3340,10 @@
         </p:nvGrpSpPr>
         <p:grpSpPr>
           <a:xfrm>
-            <a:off x="1799671" y="989416"/>
-            <a:ext cx="8538611" cy="5013745"/>
-            <a:chOff x="1799671" y="989416"/>
-            <a:chExt cx="8538611" cy="5013745"/>
+            <a:off x="1799670" y="989416"/>
+            <a:ext cx="8538612" cy="5013745"/>
+            <a:chOff x="1799670" y="989416"/>
+            <a:chExt cx="8538612" cy="5013745"/>
           </a:xfrm>
         </p:grpSpPr>
         <p:cxnSp>
@@ -4158,8 +4158,8 @@
           </p:nvSpPr>
           <p:spPr>
             <a:xfrm>
-              <a:off x="1799671" y="4925943"/>
-              <a:ext cx="6193624" cy="1077218"/>
+              <a:off x="1799670" y="4925943"/>
+              <a:ext cx="6573767" cy="1077218"/>
             </a:xfrm>
             <a:prstGeom prst="rect">
               <a:avLst/>
@@ -4176,7 +4176,19 @@
                 <a:rPr lang="en-US" sz="3200" dirty="0">
                   <a:cs typeface="Times New Roman" panose="02020603050405020304" pitchFamily="18" charset="0"/>
                 </a:rPr>
-                <a:t>The axis of rotation is perpendicular to the page and points into the page</a:t>
+                <a:t>The axis of rotation is perpendicular to the page and points </a:t>
+              </a:r>
+              <a:r>
+                <a:rPr lang="en-US" sz="3200" dirty="0" smtClean="0">
+                  <a:cs typeface="Times New Roman" panose="02020603050405020304" pitchFamily="18" charset="0"/>
+                </a:rPr>
+                <a:t>out of </a:t>
+              </a:r>
+              <a:r>
+                <a:rPr lang="en-US" sz="3200" dirty="0">
+                  <a:cs typeface="Times New Roman" panose="02020603050405020304" pitchFamily="18" charset="0"/>
+                </a:rPr>
+                <a:t>the page</a:t>
               </a:r>
               <a:endParaRPr lang="en-US" sz="3200" baseline="-25000" dirty="0">
                 <a:cs typeface="Times New Roman" panose="02020603050405020304" pitchFamily="18" charset="0"/>
@@ -4243,7 +4255,7 @@
         <mc:Choice xmlns:a14="http://schemas.microsoft.com/office/drawing/2010/main" Requires="a14">
           <p:sp>
             <p:nvSpPr>
-              <p:cNvPr id="3" name="TextBox 2">
+              <p:cNvPr id="3" name="TextBox 2" hidden="1">
                 <a:extLst>
                   <a:ext uri="{FF2B5EF4-FFF2-40B4-BE49-F238E27FC236}">
                     <a16:creationId xmlns:a16="http://schemas.microsoft.com/office/drawing/2014/main" id="{57D2EFE5-EC67-4C0E-B2F2-7BDE8AB4CFFF}"/>
@@ -4269,6 +4281,7 @@
               </a:bodyPr>
               <a:lstStyle/>
               <a:p>
+                <a:pPr/>
                 <a14:m>
                   <m:oMathPara xmlns:m="http://schemas.openxmlformats.org/officeDocument/2006/math">
                     <m:oMathParaPr>
@@ -4293,7 +4306,7 @@
         <mc:Fallback>
           <p:sp>
             <p:nvSpPr>
-              <p:cNvPr id="3" name="TextBox 2">
+              <p:cNvPr id="3" name="TextBox 2" hidden="1">
                 <a:extLst>
                   <a:ext uri="{FF2B5EF4-FFF2-40B4-BE49-F238E27FC236}">
                     <a16:creationId xmlns:a16="http://schemas.microsoft.com/office/drawing/2014/main" id="{57D2EFE5-EC67-4C0E-B2F2-7BDE8AB4CFFF}"/>
@@ -4335,6 +4348,52 @@
           </p:sp>
         </mc:Fallback>
       </mc:AlternateContent>
+      <p:sp>
+        <p:nvSpPr>
+          <p:cNvPr id="2" name="Oval 1"/>
+          <p:cNvSpPr/>
+          <p:nvPr/>
+        </p:nvSpPr>
+        <p:spPr>
+          <a:xfrm>
+            <a:off x="3661846" y="4529406"/>
+            <a:ext cx="91440" cy="91440"/>
+          </a:xfrm>
+          <a:prstGeom prst="ellipse">
+            <a:avLst/>
+          </a:prstGeom>
+          <a:solidFill>
+            <a:schemeClr val="tx1"/>
+          </a:solidFill>
+          <a:ln>
+            <a:noFill/>
+          </a:ln>
+        </p:spPr>
+        <p:style>
+          <a:lnRef idx="2">
+            <a:schemeClr val="accent1">
+              <a:shade val="50000"/>
+            </a:schemeClr>
+          </a:lnRef>
+          <a:fillRef idx="1">
+            <a:schemeClr val="accent1"/>
+          </a:fillRef>
+          <a:effectRef idx="0">
+            <a:schemeClr val="accent1"/>
+          </a:effectRef>
+          <a:fontRef idx="minor">
+            <a:schemeClr val="lt1"/>
+          </a:fontRef>
+        </p:style>
+        <p:txBody>
+          <a:bodyPr rtlCol="0" anchor="ctr"/>
+          <a:lstStyle/>
+          <a:p>
+            <a:pPr algn="ctr"/>
+            <a:endParaRPr lang="en-US"/>
+          </a:p>
+        </p:txBody>
+      </p:sp>
     </p:spTree>
     <p:extLst>
       <p:ext uri="{BB962C8B-B14F-4D97-AF65-F5344CB8AC3E}">

</xml_diff>